<commit_message>
Capstone 1 Final Slide Deck
</commit_message>
<xml_diff>
--- a/Capstone_1_Slide_Deck.pptx
+++ b/Capstone_1_Slide_Deck.pptx
@@ -340,7 +340,7 @@
             <a:fld id="{B61BEF0D-F0BB-DE4B-95CE-6DB70DBA9567}" type="datetimeFigureOut">
               <a:rPr lang="en-US" dirty="0"/>
               <a:pPr/>
-              <a:t>6/3/2018</a:t>
+              <a:t>6/15/2018</a:t>
             </a:fld>
             <a:endParaRPr lang="en-US" dirty="0"/>
           </a:p>
@@ -675,7 +675,7 @@
             <a:fld id="{B61BEF0D-F0BB-DE4B-95CE-6DB70DBA9567}" type="datetimeFigureOut">
               <a:rPr lang="en-US" dirty="0"/>
               <a:pPr/>
-              <a:t>6/3/2018</a:t>
+              <a:t>6/15/2018</a:t>
             </a:fld>
             <a:endParaRPr lang="en-US" dirty="0"/>
           </a:p>
@@ -1073,7 +1073,7 @@
             <a:fld id="{B61BEF0D-F0BB-DE4B-95CE-6DB70DBA9567}" type="datetimeFigureOut">
               <a:rPr lang="en-US" dirty="0"/>
               <a:pPr/>
-              <a:t>6/3/2018</a:t>
+              <a:t>6/15/2018</a:t>
             </a:fld>
             <a:endParaRPr lang="en-US" dirty="0"/>
           </a:p>
@@ -1405,7 +1405,7 @@
             <a:fld id="{B61BEF0D-F0BB-DE4B-95CE-6DB70DBA9567}" type="datetimeFigureOut">
               <a:rPr lang="en-US" dirty="0"/>
               <a:pPr/>
-              <a:t>6/3/2018</a:t>
+              <a:t>6/15/2018</a:t>
             </a:fld>
             <a:endParaRPr lang="en-US" dirty="0"/>
           </a:p>
@@ -1722,7 +1722,7 @@
             <a:fld id="{B61BEF0D-F0BB-DE4B-95CE-6DB70DBA9567}" type="datetimeFigureOut">
               <a:rPr lang="en-US" dirty="0"/>
               <a:pPr/>
-              <a:t>6/3/2018</a:t>
+              <a:t>6/15/2018</a:t>
             </a:fld>
             <a:endParaRPr lang="en-US" dirty="0"/>
           </a:p>
@@ -2115,7 +2115,7 @@
             <a:fld id="{B61BEF0D-F0BB-DE4B-95CE-6DB70DBA9567}" type="datetimeFigureOut">
               <a:rPr lang="en-US" dirty="0"/>
               <a:pPr/>
-              <a:t>6/3/2018</a:t>
+              <a:t>6/15/2018</a:t>
             </a:fld>
             <a:endParaRPr lang="en-US" dirty="0"/>
           </a:p>
@@ -2369,7 +2369,7 @@
             <a:fld id="{B61BEF0D-F0BB-DE4B-95CE-6DB70DBA9567}" type="datetimeFigureOut">
               <a:rPr lang="en-US" dirty="0"/>
               <a:pPr/>
-              <a:t>6/3/2018</a:t>
+              <a:t>6/15/2018</a:t>
             </a:fld>
             <a:endParaRPr lang="en-US" dirty="0"/>
           </a:p>
@@ -2628,7 +2628,7 @@
             <a:fld id="{B61BEF0D-F0BB-DE4B-95CE-6DB70DBA9567}" type="datetimeFigureOut">
               <a:rPr lang="en-US" dirty="0"/>
               <a:pPr/>
-              <a:t>6/3/2018</a:t>
+              <a:t>6/15/2018</a:t>
             </a:fld>
             <a:endParaRPr lang="en-US" dirty="0"/>
           </a:p>
@@ -2887,7 +2887,7 @@
             <a:fld id="{B61BEF0D-F0BB-DE4B-95CE-6DB70DBA9567}" type="datetimeFigureOut">
               <a:rPr lang="en-US" dirty="0"/>
               <a:pPr/>
-              <a:t>6/3/2018</a:t>
+              <a:t>6/15/2018</a:t>
             </a:fld>
             <a:endParaRPr lang="en-US" dirty="0"/>
           </a:p>
@@ -3131,7 +3131,7 @@
             <a:fld id="{B61BEF0D-F0BB-DE4B-95CE-6DB70DBA9567}" type="datetimeFigureOut">
               <a:rPr lang="en-US" dirty="0"/>
               <a:pPr/>
-              <a:t>6/3/2018</a:t>
+              <a:t>6/15/2018</a:t>
             </a:fld>
             <a:endParaRPr lang="en-US" dirty="0"/>
           </a:p>
@@ -3451,7 +3451,7 @@
             <a:fld id="{B61BEF0D-F0BB-DE4B-95CE-6DB70DBA9567}" type="datetimeFigureOut">
               <a:rPr lang="en-US" dirty="0"/>
               <a:pPr/>
-              <a:t>6/3/2018</a:t>
+              <a:t>6/15/2018</a:t>
             </a:fld>
             <a:endParaRPr lang="en-US" dirty="0"/>
           </a:p>
@@ -3905,7 +3905,7 @@
             <a:fld id="{B61BEF0D-F0BB-DE4B-95CE-6DB70DBA9567}" type="datetimeFigureOut">
               <a:rPr lang="en-US" dirty="0"/>
               <a:pPr/>
-              <a:t>6/3/2018</a:t>
+              <a:t>6/15/2018</a:t>
             </a:fld>
             <a:endParaRPr lang="en-US" dirty="0"/>
           </a:p>
@@ -4107,7 +4107,7 @@
             <a:fld id="{B61BEF0D-F0BB-DE4B-95CE-6DB70DBA9567}" type="datetimeFigureOut">
               <a:rPr lang="en-US" dirty="0"/>
               <a:pPr/>
-              <a:t>6/3/2018</a:t>
+              <a:t>6/15/2018</a:t>
             </a:fld>
             <a:endParaRPr lang="en-US" dirty="0"/>
           </a:p>
@@ -4281,7 +4281,7 @@
             <a:fld id="{B61BEF0D-F0BB-DE4B-95CE-6DB70DBA9567}" type="datetimeFigureOut">
               <a:rPr lang="en-US" dirty="0"/>
               <a:pPr/>
-              <a:t>6/3/2018</a:t>
+              <a:t>6/15/2018</a:t>
             </a:fld>
             <a:endParaRPr lang="en-US" dirty="0"/>
           </a:p>
@@ -4611,7 +4611,7 @@
             <a:fld id="{B61BEF0D-F0BB-DE4B-95CE-6DB70DBA9567}" type="datetimeFigureOut">
               <a:rPr lang="en-US" dirty="0"/>
               <a:pPr/>
-              <a:t>6/3/2018</a:t>
+              <a:t>6/15/2018</a:t>
             </a:fld>
             <a:endParaRPr lang="en-US" dirty="0"/>
           </a:p>
@@ -4953,7 +4953,7 @@
             <a:fld id="{B61BEF0D-F0BB-DE4B-95CE-6DB70DBA9567}" type="datetimeFigureOut">
               <a:rPr lang="en-US" dirty="0"/>
               <a:pPr/>
-              <a:t>6/3/2018</a:t>
+              <a:t>6/15/2018</a:t>
             </a:fld>
             <a:endParaRPr lang="en-US" dirty="0"/>
           </a:p>
@@ -7089,7 +7089,7 @@
             <a:fld id="{B61BEF0D-F0BB-DE4B-95CE-6DB70DBA9567}" type="datetimeFigureOut">
               <a:rPr lang="en-US" dirty="0"/>
               <a:pPr/>
-              <a:t>6/3/2018</a:t>
+              <a:t>6/15/2018</a:t>
             </a:fld>
             <a:endParaRPr lang="en-US" dirty="0"/>
           </a:p>
@@ -8058,7 +8058,7 @@
           <a:p>
             <a:r>
               <a:rPr lang="en-US" dirty="0"/>
-              <a:t>Conclusion and Next Steps:</a:t>
+              <a:t>Recommendations and Next Steps:</a:t>
             </a:r>
           </a:p>
         </p:txBody>
@@ -8370,96 +8370,6 @@
           <a:chExt cx="0" cy="0"/>
         </a:xfrm>
       </p:grpSpPr>
-      <p:pic>
-        <p:nvPicPr>
-          <p:cNvPr id="17" name="Picture 16">
-            <a:extLst>
-              <a:ext uri="{FF2B5EF4-FFF2-40B4-BE49-F238E27FC236}">
-                <a16:creationId xmlns:a16="http://schemas.microsoft.com/office/drawing/2014/main" id="{847B376E-3E21-45EF-9B2D-B916A5605FCE}"/>
-              </a:ext>
-            </a:extLst>
-          </p:cNvPr>
-          <p:cNvPicPr>
-            <a:picLocks noChangeAspect="1"/>
-          </p:cNvPicPr>
-          <p:nvPr/>
-        </p:nvPicPr>
-        <p:blipFill>
-          <a:blip r:embed="rId2"/>
-          <a:stretch>
-            <a:fillRect/>
-          </a:stretch>
-        </p:blipFill>
-        <p:spPr>
-          <a:xfrm>
-            <a:off x="7400685" y="1450223"/>
-            <a:ext cx="3877970" cy="3877970"/>
-          </a:xfrm>
-          <a:prstGeom prst="rect">
-            <a:avLst/>
-          </a:prstGeom>
-        </p:spPr>
-      </p:pic>
-      <p:pic>
-        <p:nvPicPr>
-          <p:cNvPr id="10" name="Picture 9">
-            <a:extLst>
-              <a:ext uri="{FF2B5EF4-FFF2-40B4-BE49-F238E27FC236}">
-                <a16:creationId xmlns:a16="http://schemas.microsoft.com/office/drawing/2014/main" id="{AAE52319-04A9-48D8-B44E-99ED3692B4AD}"/>
-              </a:ext>
-            </a:extLst>
-          </p:cNvPr>
-          <p:cNvPicPr>
-            <a:picLocks noChangeAspect="1"/>
-          </p:cNvPicPr>
-          <p:nvPr/>
-        </p:nvPicPr>
-        <p:blipFill>
-          <a:blip r:embed="rId2"/>
-          <a:stretch>
-            <a:fillRect/>
-          </a:stretch>
-        </p:blipFill>
-        <p:spPr>
-          <a:xfrm>
-            <a:off x="180974" y="1571469"/>
-            <a:ext cx="3574935" cy="3574935"/>
-          </a:xfrm>
-          <a:prstGeom prst="rect">
-            <a:avLst/>
-          </a:prstGeom>
-        </p:spPr>
-      </p:pic>
-      <p:pic>
-        <p:nvPicPr>
-          <p:cNvPr id="15" name="Picture 14">
-            <a:extLst>
-              <a:ext uri="{FF2B5EF4-FFF2-40B4-BE49-F238E27FC236}">
-                <a16:creationId xmlns:a16="http://schemas.microsoft.com/office/drawing/2014/main" id="{14EB5303-AB9B-4FDB-B75B-00A5BB723427}"/>
-              </a:ext>
-            </a:extLst>
-          </p:cNvPr>
-          <p:cNvPicPr>
-            <a:picLocks noChangeAspect="1"/>
-          </p:cNvPicPr>
-          <p:nvPr/>
-        </p:nvPicPr>
-        <p:blipFill>
-          <a:blip r:embed="rId3"/>
-          <a:stretch>
-            <a:fillRect/>
-          </a:stretch>
-        </p:blipFill>
-        <p:spPr>
-          <a:xfrm>
-            <a:off x="3744250" y="1480866"/>
-            <a:ext cx="3725817" cy="3725817"/>
-          </a:xfrm>
-          <a:prstGeom prst="rect">
-            <a:avLst/>
-          </a:prstGeom>
-        </p:spPr>
-      </p:pic>
       <p:sp>
         <p:nvSpPr>
           <p:cNvPr id="2" name="Title 1">
@@ -8558,7 +8468,7 @@
           <a:p>
             <a:r>
               <a:rPr lang="en-US" sz="2300" dirty="0"/>
-              <a:t>Star Ratings!!!</a:t>
+              <a:t>Star Ratings</a:t>
             </a:r>
           </a:p>
         </p:txBody>
@@ -8578,7 +8488,7 @@
           <p:nvPr/>
         </p:nvPicPr>
         <p:blipFill>
-          <a:blip r:embed="rId4"/>
+          <a:blip r:embed="rId2"/>
           <a:stretch>
             <a:fillRect/>
           </a:stretch>
@@ -8593,318 +8503,6 @@
           </a:prstGeom>
         </p:spPr>
       </p:pic>
-      <p:sp>
-        <p:nvSpPr>
-          <p:cNvPr id="18" name="Rectangle 17">
-            <a:extLst>
-              <a:ext uri="{FF2B5EF4-FFF2-40B4-BE49-F238E27FC236}">
-                <a16:creationId xmlns:a16="http://schemas.microsoft.com/office/drawing/2014/main" id="{4508F1C9-A42C-48F9-BA14-0774101DCBA6}"/>
-              </a:ext>
-            </a:extLst>
-          </p:cNvPr>
-          <p:cNvSpPr/>
-          <p:nvPr/>
-        </p:nvSpPr>
-        <p:spPr>
-          <a:xfrm>
-            <a:off x="1454944" y="2628899"/>
-            <a:ext cx="85725" cy="2039823"/>
-          </a:xfrm>
-          <a:prstGeom prst="rect">
-            <a:avLst/>
-          </a:prstGeom>
-          <a:noFill/>
-          <a:ln>
-            <a:solidFill>
-              <a:schemeClr val="accent6"/>
-            </a:solidFill>
-          </a:ln>
-        </p:spPr>
-        <p:style>
-          <a:lnRef idx="2">
-            <a:schemeClr val="accent1">
-              <a:shade val="50000"/>
-            </a:schemeClr>
-          </a:lnRef>
-          <a:fillRef idx="1">
-            <a:schemeClr val="accent1"/>
-          </a:fillRef>
-          <a:effectRef idx="0">
-            <a:schemeClr val="accent1"/>
-          </a:effectRef>
-          <a:fontRef idx="minor">
-            <a:schemeClr val="lt1"/>
-          </a:fontRef>
-        </p:style>
-        <p:txBody>
-          <a:bodyPr rtlCol="0" anchor="ctr"/>
-          <a:lstStyle/>
-          <a:p>
-            <a:pPr algn="ctr"/>
-            <a:endParaRPr lang="en-US"/>
-          </a:p>
-        </p:txBody>
-      </p:sp>
-      <p:sp>
-        <p:nvSpPr>
-          <p:cNvPr id="19" name="Rectangle 18">
-            <a:extLst>
-              <a:ext uri="{FF2B5EF4-FFF2-40B4-BE49-F238E27FC236}">
-                <a16:creationId xmlns:a16="http://schemas.microsoft.com/office/drawing/2014/main" id="{5882013E-AC29-4E94-8BBE-FF6EDB580CF2}"/>
-              </a:ext>
-            </a:extLst>
-          </p:cNvPr>
-          <p:cNvSpPr/>
-          <p:nvPr/>
-        </p:nvSpPr>
-        <p:spPr>
-          <a:xfrm>
-            <a:off x="425293" y="3073407"/>
-            <a:ext cx="2425063" cy="83344"/>
-          </a:xfrm>
-          <a:prstGeom prst="rect">
-            <a:avLst/>
-          </a:prstGeom>
-          <a:noFill/>
-          <a:ln>
-            <a:solidFill>
-              <a:schemeClr val="accent6"/>
-            </a:solidFill>
-          </a:ln>
-        </p:spPr>
-        <p:style>
-          <a:lnRef idx="2">
-            <a:schemeClr val="accent1">
-              <a:shade val="50000"/>
-            </a:schemeClr>
-          </a:lnRef>
-          <a:fillRef idx="1">
-            <a:schemeClr val="accent1"/>
-          </a:fillRef>
-          <a:effectRef idx="0">
-            <a:schemeClr val="accent1"/>
-          </a:effectRef>
-          <a:fontRef idx="minor">
-            <a:schemeClr val="lt1"/>
-          </a:fontRef>
-        </p:style>
-        <p:txBody>
-          <a:bodyPr rtlCol="0" anchor="ctr"/>
-          <a:lstStyle/>
-          <a:p>
-            <a:pPr algn="ctr"/>
-            <a:endParaRPr lang="en-US"/>
-          </a:p>
-        </p:txBody>
-      </p:sp>
-      <p:sp>
-        <p:nvSpPr>
-          <p:cNvPr id="20" name="Rectangle 19">
-            <a:extLst>
-              <a:ext uri="{FF2B5EF4-FFF2-40B4-BE49-F238E27FC236}">
-                <a16:creationId xmlns:a16="http://schemas.microsoft.com/office/drawing/2014/main" id="{760DFA44-D472-49B8-934B-64D51C6AB395}"/>
-              </a:ext>
-            </a:extLst>
-          </p:cNvPr>
-          <p:cNvSpPr/>
-          <p:nvPr/>
-        </p:nvSpPr>
-        <p:spPr>
-          <a:xfrm>
-            <a:off x="3997970" y="3059671"/>
-            <a:ext cx="2508821" cy="81035"/>
-          </a:xfrm>
-          <a:prstGeom prst="rect">
-            <a:avLst/>
-          </a:prstGeom>
-          <a:noFill/>
-          <a:ln>
-            <a:solidFill>
-              <a:schemeClr val="accent6"/>
-            </a:solidFill>
-          </a:ln>
-        </p:spPr>
-        <p:style>
-          <a:lnRef idx="2">
-            <a:schemeClr val="accent1">
-              <a:shade val="50000"/>
-            </a:schemeClr>
-          </a:lnRef>
-          <a:fillRef idx="1">
-            <a:schemeClr val="accent1"/>
-          </a:fillRef>
-          <a:effectRef idx="0">
-            <a:schemeClr val="accent1"/>
-          </a:effectRef>
-          <a:fontRef idx="minor">
-            <a:schemeClr val="lt1"/>
-          </a:fontRef>
-        </p:style>
-        <p:txBody>
-          <a:bodyPr rtlCol="0" anchor="ctr"/>
-          <a:lstStyle/>
-          <a:p>
-            <a:pPr algn="ctr"/>
-            <a:endParaRPr lang="en-US"/>
-          </a:p>
-        </p:txBody>
-      </p:sp>
-      <p:sp>
-        <p:nvSpPr>
-          <p:cNvPr id="21" name="Rectangle 20">
-            <a:extLst>
-              <a:ext uri="{FF2B5EF4-FFF2-40B4-BE49-F238E27FC236}">
-                <a16:creationId xmlns:a16="http://schemas.microsoft.com/office/drawing/2014/main" id="{67807317-43B3-49CF-A701-3AFEA4DD38BF}"/>
-              </a:ext>
-            </a:extLst>
-          </p:cNvPr>
-          <p:cNvSpPr/>
-          <p:nvPr/>
-        </p:nvSpPr>
-        <p:spPr>
-          <a:xfrm>
-            <a:off x="5076825" y="2588419"/>
-            <a:ext cx="90488" cy="2112169"/>
-          </a:xfrm>
-          <a:prstGeom prst="rect">
-            <a:avLst/>
-          </a:prstGeom>
-          <a:noFill/>
-          <a:ln>
-            <a:solidFill>
-              <a:schemeClr val="accent6"/>
-            </a:solidFill>
-          </a:ln>
-        </p:spPr>
-        <p:style>
-          <a:lnRef idx="2">
-            <a:schemeClr val="accent1">
-              <a:shade val="50000"/>
-            </a:schemeClr>
-          </a:lnRef>
-          <a:fillRef idx="1">
-            <a:schemeClr val="accent1"/>
-          </a:fillRef>
-          <a:effectRef idx="0">
-            <a:schemeClr val="accent1"/>
-          </a:effectRef>
-          <a:fontRef idx="minor">
-            <a:schemeClr val="lt1"/>
-          </a:fontRef>
-        </p:style>
-        <p:txBody>
-          <a:bodyPr rtlCol="0" anchor="ctr"/>
-          <a:lstStyle/>
-          <a:p>
-            <a:pPr algn="ctr"/>
-            <a:endParaRPr lang="en-US"/>
-          </a:p>
-        </p:txBody>
-      </p:sp>
-      <p:sp>
-        <p:nvSpPr>
-          <p:cNvPr id="22" name="Rectangle 21">
-            <a:extLst>
-              <a:ext uri="{FF2B5EF4-FFF2-40B4-BE49-F238E27FC236}">
-                <a16:creationId xmlns:a16="http://schemas.microsoft.com/office/drawing/2014/main" id="{F5AE1DF7-8C63-4F16-B151-BAFE4208D9AD}"/>
-              </a:ext>
-            </a:extLst>
-          </p:cNvPr>
-          <p:cNvSpPr/>
-          <p:nvPr/>
-        </p:nvSpPr>
-        <p:spPr>
-          <a:xfrm>
-            <a:off x="7656120" y="3085864"/>
-            <a:ext cx="2640405" cy="88342"/>
-          </a:xfrm>
-          <a:prstGeom prst="rect">
-            <a:avLst/>
-          </a:prstGeom>
-          <a:noFill/>
-          <a:ln>
-            <a:solidFill>
-              <a:schemeClr val="accent6"/>
-            </a:solidFill>
-          </a:ln>
-        </p:spPr>
-        <p:style>
-          <a:lnRef idx="2">
-            <a:schemeClr val="accent1">
-              <a:shade val="50000"/>
-            </a:schemeClr>
-          </a:lnRef>
-          <a:fillRef idx="1">
-            <a:schemeClr val="accent1"/>
-          </a:fillRef>
-          <a:effectRef idx="0">
-            <a:schemeClr val="accent1"/>
-          </a:effectRef>
-          <a:fontRef idx="minor">
-            <a:schemeClr val="lt1"/>
-          </a:fontRef>
-        </p:style>
-        <p:txBody>
-          <a:bodyPr rtlCol="0" anchor="ctr"/>
-          <a:lstStyle/>
-          <a:p>
-            <a:pPr algn="ctr"/>
-            <a:endParaRPr lang="en-US"/>
-          </a:p>
-        </p:txBody>
-      </p:sp>
-      <p:sp>
-        <p:nvSpPr>
-          <p:cNvPr id="23" name="Rectangle 22">
-            <a:extLst>
-              <a:ext uri="{FF2B5EF4-FFF2-40B4-BE49-F238E27FC236}">
-                <a16:creationId xmlns:a16="http://schemas.microsoft.com/office/drawing/2014/main" id="{CC95E7B8-A4FC-43DD-B8DB-296E9ED9EC5C}"/>
-              </a:ext>
-            </a:extLst>
-          </p:cNvPr>
-          <p:cNvSpPr/>
-          <p:nvPr/>
-        </p:nvSpPr>
-        <p:spPr>
-          <a:xfrm>
-            <a:off x="8790983" y="2588419"/>
-            <a:ext cx="95841" cy="2219325"/>
-          </a:xfrm>
-          <a:prstGeom prst="rect">
-            <a:avLst/>
-          </a:prstGeom>
-          <a:noFill/>
-          <a:ln>
-            <a:solidFill>
-              <a:schemeClr val="accent6"/>
-            </a:solidFill>
-          </a:ln>
-        </p:spPr>
-        <p:style>
-          <a:lnRef idx="2">
-            <a:schemeClr val="accent1">
-              <a:shade val="50000"/>
-            </a:schemeClr>
-          </a:lnRef>
-          <a:fillRef idx="1">
-            <a:schemeClr val="accent1"/>
-          </a:fillRef>
-          <a:effectRef idx="0">
-            <a:schemeClr val="accent1"/>
-          </a:effectRef>
-          <a:fontRef idx="minor">
-            <a:schemeClr val="lt1"/>
-          </a:fontRef>
-        </p:style>
-        <p:txBody>
-          <a:bodyPr rtlCol="0" anchor="ctr"/>
-          <a:lstStyle/>
-          <a:p>
-            <a:pPr algn="ctr"/>
-            <a:endParaRPr lang="en-US"/>
-          </a:p>
-        </p:txBody>
-      </p:sp>
       <p:sp>
         <p:nvSpPr>
           <p:cNvPr id="24" name="TextBox 23">
@@ -9079,6 +8677,96 @@
           </a:p>
         </p:txBody>
       </p:sp>
+      <p:pic>
+        <p:nvPicPr>
+          <p:cNvPr id="5" name="Picture 4">
+            <a:extLst>
+              <a:ext uri="{FF2B5EF4-FFF2-40B4-BE49-F238E27FC236}">
+                <a16:creationId xmlns:a16="http://schemas.microsoft.com/office/drawing/2014/main" id="{FB4B34F1-EBC1-42F7-A960-D9E5ADC7C071}"/>
+              </a:ext>
+            </a:extLst>
+          </p:cNvPr>
+          <p:cNvPicPr>
+            <a:picLocks noChangeAspect="1"/>
+          </p:cNvPicPr>
+          <p:nvPr/>
+        </p:nvPicPr>
+        <p:blipFill>
+          <a:blip r:embed="rId3"/>
+          <a:stretch>
+            <a:fillRect/>
+          </a:stretch>
+        </p:blipFill>
+        <p:spPr>
+          <a:xfrm>
+            <a:off x="7656120" y="2136822"/>
+            <a:ext cx="2926243" cy="2738663"/>
+          </a:xfrm>
+          <a:prstGeom prst="rect">
+            <a:avLst/>
+          </a:prstGeom>
+        </p:spPr>
+      </p:pic>
+      <p:pic>
+        <p:nvPicPr>
+          <p:cNvPr id="7" name="Picture 6">
+            <a:extLst>
+              <a:ext uri="{FF2B5EF4-FFF2-40B4-BE49-F238E27FC236}">
+                <a16:creationId xmlns:a16="http://schemas.microsoft.com/office/drawing/2014/main" id="{4A9284FF-6670-4DCD-915A-DF9B430301A9}"/>
+              </a:ext>
+            </a:extLst>
+          </p:cNvPr>
+          <p:cNvPicPr>
+            <a:picLocks noChangeAspect="1"/>
+          </p:cNvPicPr>
+          <p:nvPr/>
+        </p:nvPicPr>
+        <p:blipFill>
+          <a:blip r:embed="rId4"/>
+          <a:stretch>
+            <a:fillRect/>
+          </a:stretch>
+        </p:blipFill>
+        <p:spPr>
+          <a:xfrm>
+            <a:off x="212214" y="2197813"/>
+            <a:ext cx="2789244" cy="2724712"/>
+          </a:xfrm>
+          <a:prstGeom prst="rect">
+            <a:avLst/>
+          </a:prstGeom>
+        </p:spPr>
+      </p:pic>
+      <p:pic>
+        <p:nvPicPr>
+          <p:cNvPr id="11" name="Picture 10">
+            <a:extLst>
+              <a:ext uri="{FF2B5EF4-FFF2-40B4-BE49-F238E27FC236}">
+                <a16:creationId xmlns:a16="http://schemas.microsoft.com/office/drawing/2014/main" id="{0FA2367A-0C61-4E05-BA23-091AAE00B896}"/>
+              </a:ext>
+            </a:extLst>
+          </p:cNvPr>
+          <p:cNvPicPr>
+            <a:picLocks noChangeAspect="1"/>
+          </p:cNvPicPr>
+          <p:nvPr/>
+        </p:nvPicPr>
+        <p:blipFill>
+          <a:blip r:embed="rId5"/>
+          <a:stretch>
+            <a:fillRect/>
+          </a:stretch>
+        </p:blipFill>
+        <p:spPr>
+          <a:xfrm>
+            <a:off x="3929349" y="2136822"/>
+            <a:ext cx="2990272" cy="2784309"/>
+          </a:xfrm>
+          <a:prstGeom prst="rect">
+            <a:avLst/>
+          </a:prstGeom>
+        </p:spPr>
+      </p:pic>
     </p:spTree>
     <p:extLst>
       <p:ext uri="{BB962C8B-B14F-4D97-AF65-F5344CB8AC3E}">
@@ -9244,6 +8932,148 @@
           </a:p>
         </p:txBody>
       </p:sp>
+      <p:sp>
+        <p:nvSpPr>
+          <p:cNvPr id="3" name="TextBox 2">
+            <a:extLst>
+              <a:ext uri="{FF2B5EF4-FFF2-40B4-BE49-F238E27FC236}">
+                <a16:creationId xmlns:a16="http://schemas.microsoft.com/office/drawing/2014/main" id="{C55C8152-9E29-4DF0-9FBD-7A57A58630E9}"/>
+              </a:ext>
+            </a:extLst>
+          </p:cNvPr>
+          <p:cNvSpPr txBox="1"/>
+          <p:nvPr/>
+        </p:nvSpPr>
+        <p:spPr>
+          <a:xfrm>
+            <a:off x="6096000" y="5247434"/>
+            <a:ext cx="6143204" cy="2862322"/>
+          </a:xfrm>
+          <a:prstGeom prst="rect">
+            <a:avLst/>
+          </a:prstGeom>
+          <a:noFill/>
+        </p:spPr>
+        <p:txBody>
+          <a:bodyPr wrap="square" rtlCol="0">
+            <a:spAutoFit/>
+          </a:bodyPr>
+          <a:lstStyle/>
+          <a:p>
+            <a:pPr algn="ctr"/>
+            <a:r>
+              <a:rPr lang="en-US" dirty="0"/>
+              <a:t>Sources:</a:t>
+            </a:r>
+          </a:p>
+          <a:p>
+            <a:pPr marL="171450" indent="-171450">
+              <a:buFont typeface="Arial" panose="020B0604020202020204" pitchFamily="34" charset="0"/>
+              <a:buChar char="•"/>
+            </a:pPr>
+            <a:r>
+              <a:rPr lang="en-US" sz="1200" u="sng" dirty="0">
+                <a:hlinkClick r:id="rId5"/>
+              </a:rPr>
+              <a:t>https://catalog.data.gov/dataset/hospital-readmissions-reduction-program</a:t>
+            </a:r>
+            <a:endParaRPr lang="en-US" sz="1200" u="sng" dirty="0"/>
+          </a:p>
+          <a:p>
+            <a:pPr marL="171450" indent="-171450">
+              <a:buFont typeface="Arial" panose="020B0604020202020204" pitchFamily="34" charset="0"/>
+              <a:buChar char="•"/>
+            </a:pPr>
+            <a:r>
+              <a:rPr lang="en-US" sz="1200" u="sng" dirty="0">
+                <a:hlinkClick r:id="rId6"/>
+              </a:rPr>
+              <a:t>https://medicare.gov/download/HomeHealthCompare/2016/October/HHCArchive_Revised_Flatfiles_20161019.zip</a:t>
+            </a:r>
+            <a:endParaRPr lang="en-US" sz="1200" u="sng" dirty="0"/>
+          </a:p>
+          <a:p>
+            <a:pPr marL="171450" indent="-171450">
+              <a:buFont typeface="Arial" panose="020B0604020202020204" pitchFamily="34" charset="0"/>
+              <a:buChar char="•"/>
+            </a:pPr>
+            <a:r>
+              <a:rPr lang="en-US" sz="1200" u="sng" dirty="0">
+                <a:hlinkClick r:id="rId7"/>
+              </a:rPr>
+              <a:t>https://catalog.data.gov/dataset/home-health-care-agencies-c1765</a:t>
+            </a:r>
+            <a:endParaRPr lang="en-US" sz="1200" u="sng" dirty="0"/>
+          </a:p>
+          <a:p>
+            <a:pPr marL="171450" indent="-171450">
+              <a:buFont typeface="Arial" panose="020B0604020202020204" pitchFamily="34" charset="0"/>
+              <a:buChar char="•"/>
+            </a:pPr>
+            <a:r>
+              <a:rPr lang="en-US" sz="1200" u="sng" dirty="0">
+                <a:hlinkClick r:id="rId8"/>
+              </a:rPr>
+              <a:t>https://www.cms.gov/Research-Statistics-Data-and-Systems</a:t>
+            </a:r>
+            <a:r>
+              <a:rPr lang="en-US" sz="1200" u="sng" dirty="0">
+                <a:solidFill>
+                  <a:schemeClr val="accent2"/>
+                </a:solidFill>
+                <a:hlinkClick r:id="rId8"/>
+              </a:rPr>
+              <a:t>/Downloadable-Public-Use-Files/Provider-of-Services/POS2016.html</a:t>
+            </a:r>
+            <a:endParaRPr lang="en-US" sz="1200" u="sng" dirty="0">
+              <a:solidFill>
+                <a:schemeClr val="accent2"/>
+              </a:solidFill>
+            </a:endParaRPr>
+          </a:p>
+          <a:p>
+            <a:pPr marL="171450" indent="-171450">
+              <a:buFont typeface="Arial" panose="020B0604020202020204" pitchFamily="34" charset="0"/>
+              <a:buChar char="•"/>
+            </a:pPr>
+            <a:r>
+              <a:rPr lang="en-US" sz="1200" u="sng" dirty="0">
+                <a:hlinkClick r:id="rId9"/>
+              </a:rPr>
+              <a:t>https://en.wikipedia.org/wiki/Hospital_readmission</a:t>
+            </a:r>
+            <a:endParaRPr lang="en-US" sz="1200" u="sng" dirty="0"/>
+          </a:p>
+          <a:p>
+            <a:pPr marL="171450" indent="-171450">
+              <a:buFont typeface="Arial" panose="020B0604020202020204" pitchFamily="34" charset="0"/>
+              <a:buChar char="•"/>
+            </a:pPr>
+            <a:endParaRPr lang="en-US" sz="1200" dirty="0"/>
+          </a:p>
+          <a:p>
+            <a:pPr marL="171450" indent="-171450">
+              <a:buFont typeface="Arial" panose="020B0604020202020204" pitchFamily="34" charset="0"/>
+              <a:buChar char="•"/>
+            </a:pPr>
+            <a:endParaRPr lang="en-US" sz="1200" dirty="0"/>
+          </a:p>
+          <a:p>
+            <a:endParaRPr lang="en-US" sz="1200" dirty="0"/>
+          </a:p>
+          <a:p>
+            <a:endParaRPr lang="en-US" sz="1200" dirty="0"/>
+          </a:p>
+          <a:p>
+            <a:pPr algn="r"/>
+            <a:endParaRPr lang="en-US" sz="1200" dirty="0"/>
+          </a:p>
+          <a:p>
+            <a:pPr algn="r"/>
+            <a:endParaRPr lang="en-US" dirty="0"/>
+          </a:p>
+        </p:txBody>
+      </p:sp>
     </p:spTree>
     <p:extLst>
       <p:ext uri="{BB962C8B-B14F-4D97-AF65-F5344CB8AC3E}">
@@ -9340,7 +9170,7 @@
               <a:t>Per CMS, there was a </a:t>
             </a:r>
             <a:r>
-              <a:rPr lang="en-US" dirty="0">
+              <a:rPr lang="en-US" b="1" dirty="0">
                 <a:solidFill>
                   <a:srgbClr val="FF0000"/>
                 </a:solidFill>
@@ -9348,8 +9178,12 @@
               <a:t>17.6%</a:t>
             </a:r>
             <a:r>
+              <a:rPr lang="en-US" b="1" dirty="0"/>
+              <a:t> </a:t>
+            </a:r>
+            <a:r>
               <a:rPr lang="en-US" dirty="0"/>
-              <a:t> 30-day readmission rate for Medicare enrollees in 2005.</a:t>
+              <a:t>30-day readmission rate for Medicare enrollees in 2005.</a:t>
             </a:r>
           </a:p>
           <a:p>
@@ -9555,9 +9389,9 @@
             <a:avLst/>
           </a:prstGeom>
           <a:solidFill>
-            <a:schemeClr val="accent2">
-              <a:lumMod val="20000"/>
-              <a:lumOff val="80000"/>
+            <a:schemeClr val="accent4">
+              <a:lumMod val="60000"/>
+              <a:lumOff val="40000"/>
             </a:schemeClr>
           </a:solidFill>
           <a:ln>
@@ -9573,11 +9407,14 @@
           <a:lstStyle/>
           <a:p>
             <a:pPr marL="285750" indent="-285750">
+              <a:buClr>
+                <a:schemeClr val="tx1"/>
+              </a:buClr>
               <a:buFont typeface="Arial" panose="020B0604020202020204" pitchFamily="34" charset="0"/>
               <a:buChar char="•"/>
             </a:pPr>
             <a:r>
-              <a:rPr lang="en-US" dirty="0">
+              <a:rPr lang="en-US" b="1" dirty="0">
                 <a:solidFill>
                   <a:srgbClr val="00B050"/>
                 </a:solidFill>
@@ -9609,7 +9446,7 @@
               <a:t>Patient Savings of </a:t>
             </a:r>
             <a:r>
-              <a:rPr lang="en-US" dirty="0">
+              <a:rPr lang="en-US" b="1" dirty="0">
                 <a:solidFill>
                   <a:srgbClr val="00B050"/>
                 </a:solidFill>
@@ -9617,8 +9454,12 @@
               <a:t>$3,070</a:t>
             </a:r>
             <a:r>
+              <a:rPr lang="en-US" b="1" dirty="0"/>
+              <a:t> </a:t>
+            </a:r>
+            <a:r>
               <a:rPr lang="en-US" dirty="0"/>
-              <a:t> in the first year.</a:t>
+              <a:t>in the first year.</a:t>
             </a:r>
           </a:p>
           <a:p>
@@ -9631,7 +9472,7 @@
               <a:t>Patient Savings of </a:t>
             </a:r>
             <a:r>
-              <a:rPr lang="en-US" dirty="0">
+              <a:rPr lang="en-US" b="1" dirty="0">
                 <a:solidFill>
                   <a:srgbClr val="00B050"/>
                 </a:solidFill>
@@ -9639,8 +9480,12 @@
               <a:t>$1,010</a:t>
             </a:r>
             <a:r>
+              <a:rPr lang="en-US" b="1" dirty="0"/>
+              <a:t> </a:t>
+            </a:r>
+            <a:r>
               <a:rPr lang="en-US" dirty="0"/>
-              <a:t> in the following year.</a:t>
+              <a:t>in the following year.</a:t>
             </a:r>
           </a:p>
         </p:txBody>
@@ -9666,8 +9511,9 @@
             <a:avLst/>
           </a:prstGeom>
           <a:solidFill>
-            <a:schemeClr val="bg2">
-              <a:lumMod val="90000"/>
+            <a:schemeClr val="tx2">
+              <a:lumMod val="60000"/>
+              <a:lumOff val="40000"/>
             </a:schemeClr>
           </a:solidFill>
           <a:ln>
@@ -10727,7 +10573,7 @@
             <a:ext cx="4342892" cy="409153"/>
           </a:xfrm>
           <a:solidFill>
-            <a:schemeClr val="tx2">
+            <a:schemeClr val="accent4">
               <a:lumMod val="60000"/>
               <a:lumOff val="40000"/>
             </a:schemeClr>
@@ -10767,7 +10613,7 @@
             <a:ext cx="4342893" cy="3354060"/>
           </a:xfrm>
           <a:solidFill>
-            <a:schemeClr val="tx2">
+            <a:schemeClr val="accent4">
               <a:lumMod val="60000"/>
               <a:lumOff val="40000"/>
             </a:schemeClr>
@@ -10838,7 +10684,7 @@
             <a:ext cx="4338673" cy="409153"/>
           </a:xfrm>
           <a:solidFill>
-            <a:schemeClr val="accent4">
+            <a:schemeClr val="tx2">
               <a:lumMod val="60000"/>
               <a:lumOff val="40000"/>
             </a:schemeClr>
@@ -10878,7 +10724,7 @@
             <a:ext cx="4338674" cy="3354060"/>
           </a:xfrm>
           <a:solidFill>
-            <a:schemeClr val="accent4">
+            <a:schemeClr val="tx2">
               <a:lumMod val="60000"/>
               <a:lumOff val="40000"/>
             </a:schemeClr>
@@ -10946,7 +10792,7 @@
             <a:avLst/>
           </a:prstGeom>
           <a:solidFill>
-            <a:schemeClr val="accent4">
+            <a:schemeClr val="tx2">
               <a:lumMod val="60000"/>
               <a:lumOff val="40000"/>
             </a:schemeClr>
@@ -10998,7 +10844,7 @@
             <a:avLst/>
           </a:prstGeom>
           <a:solidFill>
-            <a:schemeClr val="tx2">
+            <a:schemeClr val="accent4">
               <a:lumMod val="60000"/>
               <a:lumOff val="40000"/>
             </a:schemeClr>
@@ -11186,7 +11032,7 @@
             <a:ext cx="3329116" cy="409153"/>
           </a:xfrm>
           <a:solidFill>
-            <a:schemeClr val="tx2">
+            <a:schemeClr val="accent4">
               <a:lumMod val="60000"/>
               <a:lumOff val="40000"/>
             </a:schemeClr>
@@ -12697,10 +12543,10 @@
       </p:grpSpPr>
       <p:pic>
         <p:nvPicPr>
-          <p:cNvPr id="18" name="Picture 17">
+          <p:cNvPr id="15" name="Picture 14">
             <a:extLst>
               <a:ext uri="{FF2B5EF4-FFF2-40B4-BE49-F238E27FC236}">
-                <a16:creationId xmlns:a16="http://schemas.microsoft.com/office/drawing/2014/main" id="{D3DB1C17-32B4-43FF-8A46-419F24B95E1B}"/>
+                <a16:creationId xmlns:a16="http://schemas.microsoft.com/office/drawing/2014/main" id="{B1068EEB-171A-4CC3-9FF5-C26B0B363BD4}"/>
               </a:ext>
             </a:extLst>
           </p:cNvPr>
@@ -12717,8 +12563,8 @@
         </p:blipFill>
         <p:spPr>
           <a:xfrm>
-            <a:off x="8699144" y="4423743"/>
-            <a:ext cx="3146248" cy="2097498"/>
+            <a:off x="84873" y="1788013"/>
+            <a:ext cx="5333035" cy="4806370"/>
           </a:xfrm>
           <a:prstGeom prst="rect">
             <a:avLst/>
@@ -12727,10 +12573,10 @@
       </p:pic>
       <p:pic>
         <p:nvPicPr>
-          <p:cNvPr id="21" name="Picture 20">
+          <p:cNvPr id="18" name="Picture 17">
             <a:extLst>
               <a:ext uri="{FF2B5EF4-FFF2-40B4-BE49-F238E27FC236}">
-                <a16:creationId xmlns:a16="http://schemas.microsoft.com/office/drawing/2014/main" id="{432C2B99-A8F1-4F4B-829B-78F3EF523187}"/>
+                <a16:creationId xmlns:a16="http://schemas.microsoft.com/office/drawing/2014/main" id="{D3DB1C17-32B4-43FF-8A46-419F24B95E1B}"/>
               </a:ext>
             </a:extLst>
           </p:cNvPr>
@@ -12747,13 +12593,12 @@
         </p:blipFill>
         <p:spPr>
           <a:xfrm>
-            <a:off x="0" y="1726909"/>
-            <a:ext cx="5915526" cy="4436644"/>
+            <a:off x="8699144" y="4423743"/>
+            <a:ext cx="3146248" cy="2097498"/>
           </a:xfrm>
           <a:prstGeom prst="rect">
             <a:avLst/>
           </a:prstGeom>
-          <a:noFill/>
         </p:spPr>
       </p:pic>
       <p:sp>
@@ -12951,10 +12796,45 @@
       </p:pic>
       <p:sp>
         <p:nvSpPr>
-          <p:cNvPr id="22" name="Rectangle 21">
+          <p:cNvPr id="24" name="TextBox 23">
             <a:extLst>
               <a:ext uri="{FF2B5EF4-FFF2-40B4-BE49-F238E27FC236}">
-                <a16:creationId xmlns:a16="http://schemas.microsoft.com/office/drawing/2014/main" id="{EB303AED-975A-4800-986C-BD83BDAFF071}"/>
+                <a16:creationId xmlns:a16="http://schemas.microsoft.com/office/drawing/2014/main" id="{7E1B686F-2C36-49A9-861B-E996115629C3}"/>
+              </a:ext>
+            </a:extLst>
+          </p:cNvPr>
+          <p:cNvSpPr txBox="1"/>
+          <p:nvPr/>
+        </p:nvSpPr>
+        <p:spPr>
+          <a:xfrm>
+            <a:off x="1619793" y="6289901"/>
+            <a:ext cx="2667000" cy="369332"/>
+          </a:xfrm>
+          <a:prstGeom prst="rect">
+            <a:avLst/>
+          </a:prstGeom>
+          <a:noFill/>
+        </p:spPr>
+        <p:txBody>
+          <a:bodyPr wrap="square" rtlCol="0">
+            <a:spAutoFit/>
+          </a:bodyPr>
+          <a:lstStyle/>
+          <a:p>
+            <a:r>
+              <a:rPr lang="en-US" dirty="0"/>
+              <a:t>Total Observations: 51</a:t>
+            </a:r>
+          </a:p>
+        </p:txBody>
+      </p:sp>
+      <p:sp>
+        <p:nvSpPr>
+          <p:cNvPr id="17" name="Rectangle 16">
+            <a:extLst>
+              <a:ext uri="{FF2B5EF4-FFF2-40B4-BE49-F238E27FC236}">
+                <a16:creationId xmlns:a16="http://schemas.microsoft.com/office/drawing/2014/main" id="{76E0730C-909B-4525-98EA-A2996F35FCAA}"/>
               </a:ext>
             </a:extLst>
           </p:cNvPr>
@@ -12963,8 +12843,8 @@
         </p:nvSpPr>
         <p:spPr>
           <a:xfrm>
-            <a:off x="678655" y="2340768"/>
-            <a:ext cx="3736183" cy="116681"/>
+            <a:off x="400050" y="2011126"/>
+            <a:ext cx="4359275" cy="116125"/>
           </a:xfrm>
           <a:prstGeom prst="rect">
             <a:avLst/>
@@ -12998,10 +12878,10 @@
       </p:sp>
       <p:sp>
         <p:nvSpPr>
-          <p:cNvPr id="23" name="Rectangle: Rounded Corners 22">
+          <p:cNvPr id="19" name="Rectangle 18">
             <a:extLst>
               <a:ext uri="{FF2B5EF4-FFF2-40B4-BE49-F238E27FC236}">
-                <a16:creationId xmlns:a16="http://schemas.microsoft.com/office/drawing/2014/main" id="{267F8246-730A-41DB-9849-4B288F1A8CF4}"/>
+                <a16:creationId xmlns:a16="http://schemas.microsoft.com/office/drawing/2014/main" id="{00C63CA4-D362-40F4-9571-DFA2163A76F6}"/>
               </a:ext>
             </a:extLst>
           </p:cNvPr>
@@ -13010,10 +12890,10 @@
         </p:nvSpPr>
         <p:spPr>
           <a:xfrm>
-            <a:off x="1143000" y="2245519"/>
-            <a:ext cx="104775" cy="3741814"/>
-          </a:xfrm>
-          <a:prstGeom prst="roundRect">
+            <a:off x="1244600" y="1924050"/>
+            <a:ext cx="107950" cy="4365851"/>
+          </a:xfrm>
+          <a:prstGeom prst="rect">
             <a:avLst/>
           </a:prstGeom>
           <a:noFill/>
@@ -13045,36 +12925,47 @@
       </p:sp>
       <p:sp>
         <p:nvSpPr>
-          <p:cNvPr id="24" name="TextBox 23">
+          <p:cNvPr id="20" name="Arrow: Right 19">
             <a:extLst>
               <a:ext uri="{FF2B5EF4-FFF2-40B4-BE49-F238E27FC236}">
-                <a16:creationId xmlns:a16="http://schemas.microsoft.com/office/drawing/2014/main" id="{7E1B686F-2C36-49A9-861B-E996115629C3}"/>
+                <a16:creationId xmlns:a16="http://schemas.microsoft.com/office/drawing/2014/main" id="{EE474216-013F-4562-834C-E356D62CEB6A}"/>
               </a:ext>
             </a:extLst>
           </p:cNvPr>
-          <p:cNvSpPr txBox="1"/>
+          <p:cNvSpPr/>
           <p:nvPr/>
         </p:nvSpPr>
         <p:spPr>
-          <a:xfrm>
-            <a:off x="1619793" y="6289901"/>
-            <a:ext cx="2667000" cy="369332"/>
-          </a:xfrm>
-          <a:prstGeom prst="rect">
+          <a:xfrm rot="10800000">
+            <a:off x="5395364" y="3930344"/>
+            <a:ext cx="312332" cy="183981"/>
+          </a:xfrm>
+          <a:prstGeom prst="rightArrow">
             <a:avLst/>
           </a:prstGeom>
-          <a:noFill/>
-        </p:spPr>
-        <p:txBody>
-          <a:bodyPr wrap="square" rtlCol="0">
-            <a:spAutoFit/>
-          </a:bodyPr>
+        </p:spPr>
+        <p:style>
+          <a:lnRef idx="2">
+            <a:schemeClr val="accent1">
+              <a:shade val="50000"/>
+            </a:schemeClr>
+          </a:lnRef>
+          <a:fillRef idx="1">
+            <a:schemeClr val="accent1"/>
+          </a:fillRef>
+          <a:effectRef idx="0">
+            <a:schemeClr val="accent1"/>
+          </a:effectRef>
+          <a:fontRef idx="minor">
+            <a:schemeClr val="lt1"/>
+          </a:fontRef>
+        </p:style>
+        <p:txBody>
+          <a:bodyPr rtlCol="0" anchor="ctr"/>
           <a:lstStyle/>
           <a:p>
-            <a:r>
-              <a:rPr lang="en-US" dirty="0"/>
-              <a:t>Total Observations: 51</a:t>
-            </a:r>
+            <a:pPr algn="ctr"/>
+            <a:endParaRPr lang="en-US"/>
           </a:p>
         </p:txBody>
       </p:sp>
@@ -13108,12 +12999,167 @@
           <a:chExt cx="0" cy="0"/>
         </a:xfrm>
       </p:grpSpPr>
+      <p:sp>
+        <p:nvSpPr>
+          <p:cNvPr id="2" name="Title 1">
+            <a:extLst>
+              <a:ext uri="{FF2B5EF4-FFF2-40B4-BE49-F238E27FC236}">
+                <a16:creationId xmlns:a16="http://schemas.microsoft.com/office/drawing/2014/main" id="{D09AC192-7915-4083-8C86-405CD771995C}"/>
+              </a:ext>
+            </a:extLst>
+          </p:cNvPr>
+          <p:cNvSpPr>
+            <a:spLocks noGrp="1"/>
+          </p:cNvSpPr>
+          <p:nvPr>
+            <p:ph type="title"/>
+          </p:nvPr>
+        </p:nvSpPr>
+        <p:spPr>
+          <a:xfrm>
+            <a:off x="180974" y="86240"/>
+            <a:ext cx="10487025" cy="1280890"/>
+          </a:xfrm>
+        </p:spPr>
+        <p:txBody>
+          <a:bodyPr/>
+          <a:lstStyle/>
+          <a:p>
+            <a:r>
+              <a:rPr lang="en-US" dirty="0"/>
+              <a:t>Data Exploration:  Grouped by Zip Code</a:t>
+            </a:r>
+          </a:p>
+        </p:txBody>
+      </p:sp>
+      <p:sp>
+        <p:nvSpPr>
+          <p:cNvPr id="8" name="TextBox 7">
+            <a:extLst>
+              <a:ext uri="{FF2B5EF4-FFF2-40B4-BE49-F238E27FC236}">
+                <a16:creationId xmlns:a16="http://schemas.microsoft.com/office/drawing/2014/main" id="{C5E1A4DB-E44C-45C5-B804-3D480B928224}"/>
+              </a:ext>
+            </a:extLst>
+          </p:cNvPr>
+          <p:cNvSpPr txBox="1"/>
+          <p:nvPr/>
+        </p:nvSpPr>
+        <p:spPr>
+          <a:xfrm>
+            <a:off x="180976" y="720799"/>
+            <a:ext cx="11658600" cy="646331"/>
+          </a:xfrm>
+          <a:prstGeom prst="rect">
+            <a:avLst/>
+          </a:prstGeom>
+          <a:noFill/>
+        </p:spPr>
+        <p:txBody>
+          <a:bodyPr wrap="square" rtlCol="0">
+            <a:spAutoFit/>
+          </a:bodyPr>
+          <a:lstStyle/>
+          <a:p>
+            <a:r>
+              <a:rPr lang="en-US" dirty="0"/>
+              <a:t>Uncertain of the applicability of these relationships.  A new dataset was drafted grouping by zip code to see what relationships withheld a significant increase to the number of observations.</a:t>
+            </a:r>
+          </a:p>
+        </p:txBody>
+      </p:sp>
+      <p:sp>
+        <p:nvSpPr>
+          <p:cNvPr id="13" name="TextBox 12">
+            <a:extLst>
+              <a:ext uri="{FF2B5EF4-FFF2-40B4-BE49-F238E27FC236}">
+                <a16:creationId xmlns:a16="http://schemas.microsoft.com/office/drawing/2014/main" id="{733F826F-203D-499A-9D79-BCF605ED1FCD}"/>
+              </a:ext>
+            </a:extLst>
+          </p:cNvPr>
+          <p:cNvSpPr txBox="1"/>
+          <p:nvPr/>
+        </p:nvSpPr>
+        <p:spPr>
+          <a:xfrm>
+            <a:off x="1538288" y="6326981"/>
+            <a:ext cx="2761707" cy="369332"/>
+          </a:xfrm>
+          <a:prstGeom prst="rect">
+            <a:avLst/>
+          </a:prstGeom>
+          <a:noFill/>
+        </p:spPr>
+        <p:txBody>
+          <a:bodyPr wrap="square" rtlCol="0">
+            <a:spAutoFit/>
+          </a:bodyPr>
+          <a:lstStyle/>
+          <a:p>
+            <a:r>
+              <a:rPr lang="en-US" dirty="0"/>
+              <a:t>Total Observations: 820</a:t>
+            </a:r>
+          </a:p>
+        </p:txBody>
+      </p:sp>
+      <p:sp>
+        <p:nvSpPr>
+          <p:cNvPr id="14" name="TextBox 13">
+            <a:extLst>
+              <a:ext uri="{FF2B5EF4-FFF2-40B4-BE49-F238E27FC236}">
+                <a16:creationId xmlns:a16="http://schemas.microsoft.com/office/drawing/2014/main" id="{67174E7F-1EDC-4332-B386-5B60D76A5129}"/>
+              </a:ext>
+            </a:extLst>
+          </p:cNvPr>
+          <p:cNvSpPr txBox="1"/>
+          <p:nvPr/>
+        </p:nvSpPr>
+        <p:spPr>
+          <a:xfrm>
+            <a:off x="5829300" y="1367130"/>
+            <a:ext cx="5305425" cy="2031325"/>
+          </a:xfrm>
+          <a:prstGeom prst="rect">
+            <a:avLst/>
+          </a:prstGeom>
+          <a:noFill/>
+        </p:spPr>
+        <p:txBody>
+          <a:bodyPr wrap="square" rtlCol="0">
+            <a:spAutoFit/>
+          </a:bodyPr>
+          <a:lstStyle/>
+          <a:p>
+            <a:pPr marL="285750" indent="-285750">
+              <a:buFont typeface="Arial" panose="020B0604020202020204" pitchFamily="34" charset="0"/>
+              <a:buChar char="•"/>
+            </a:pPr>
+            <a:r>
+              <a:rPr lang="en-US" dirty="0"/>
+              <a:t>The relationships seen in the data by state all but vanished when more observations were added to the model. </a:t>
+            </a:r>
+          </a:p>
+          <a:p>
+            <a:endParaRPr lang="en-US" dirty="0"/>
+          </a:p>
+          <a:p>
+            <a:pPr marL="285750" indent="-285750">
+              <a:buFont typeface="Arial" panose="020B0604020202020204" pitchFamily="34" charset="0"/>
+              <a:buChar char="•"/>
+            </a:pPr>
+            <a:r>
+              <a:rPr lang="en-US" dirty="0"/>
+              <a:t>Since there is a wide range of variation in the data, could scaling the features reveal relationships currently muted out by noise?</a:t>
+            </a:r>
+          </a:p>
+        </p:txBody>
+      </p:sp>
       <p:pic>
         <p:nvPicPr>
-          <p:cNvPr id="10" name="Picture 9">
+          <p:cNvPr id="4" name="Picture 3">
             <a:extLst>
               <a:ext uri="{FF2B5EF4-FFF2-40B4-BE49-F238E27FC236}">
-                <a16:creationId xmlns:a16="http://schemas.microsoft.com/office/drawing/2014/main" id="{5F7E8C00-3D06-4410-9765-1E613EA3EF24}"/>
+                <a16:creationId xmlns:a16="http://schemas.microsoft.com/office/drawing/2014/main" id="{65728A9A-BE6B-4019-B8D8-F3C4CE3337E6}"/>
               </a:ext>
             </a:extLst>
           </p:cNvPr>
@@ -13130,88 +13176,50 @@
         </p:blipFill>
         <p:spPr>
           <a:xfrm>
-            <a:off x="533400" y="1367130"/>
-            <a:ext cx="5295900" cy="5295900"/>
+            <a:off x="5259690" y="3488309"/>
+            <a:ext cx="6437938" cy="3208004"/>
           </a:xfrm>
           <a:prstGeom prst="rect">
             <a:avLst/>
           </a:prstGeom>
         </p:spPr>
       </p:pic>
-      <p:sp>
-        <p:nvSpPr>
-          <p:cNvPr id="2" name="Title 1">
+      <p:pic>
+        <p:nvPicPr>
+          <p:cNvPr id="5" name="Picture 4">
             <a:extLst>
               <a:ext uri="{FF2B5EF4-FFF2-40B4-BE49-F238E27FC236}">
-                <a16:creationId xmlns:a16="http://schemas.microsoft.com/office/drawing/2014/main" id="{D09AC192-7915-4083-8C86-405CD771995C}"/>
+                <a16:creationId xmlns:a16="http://schemas.microsoft.com/office/drawing/2014/main" id="{A6F9A470-8A72-4242-91C8-3BFA1A228250}"/>
               </a:ext>
             </a:extLst>
           </p:cNvPr>
-          <p:cNvSpPr>
-            <a:spLocks noGrp="1"/>
-          </p:cNvSpPr>
-          <p:nvPr>
-            <p:ph type="title"/>
-          </p:nvPr>
-        </p:nvSpPr>
-        <p:spPr>
-          <a:xfrm>
-            <a:off x="180974" y="86240"/>
-            <a:ext cx="10487025" cy="1280890"/>
-          </a:xfrm>
-        </p:spPr>
-        <p:txBody>
-          <a:bodyPr/>
-          <a:lstStyle/>
-          <a:p>
-            <a:r>
-              <a:rPr lang="en-US" dirty="0"/>
-              <a:t>Data Exploration:  Grouped by Zip Code</a:t>
-            </a:r>
-          </a:p>
-        </p:txBody>
-      </p:sp>
-      <p:sp>
-        <p:nvSpPr>
-          <p:cNvPr id="8" name="TextBox 7">
-            <a:extLst>
-              <a:ext uri="{FF2B5EF4-FFF2-40B4-BE49-F238E27FC236}">
-                <a16:creationId xmlns:a16="http://schemas.microsoft.com/office/drawing/2014/main" id="{C5E1A4DB-E44C-45C5-B804-3D480B928224}"/>
-              </a:ext>
-            </a:extLst>
-          </p:cNvPr>
-          <p:cNvSpPr txBox="1"/>
+          <p:cNvPicPr>
+            <a:picLocks noChangeAspect="1"/>
+          </p:cNvPicPr>
           <p:nvPr/>
-        </p:nvSpPr>
-        <p:spPr>
-          <a:xfrm>
-            <a:off x="180976" y="720799"/>
-            <a:ext cx="11658600" cy="646331"/>
+        </p:nvPicPr>
+        <p:blipFill>
+          <a:blip r:embed="rId3"/>
+          <a:stretch>
+            <a:fillRect/>
+          </a:stretch>
+        </p:blipFill>
+        <p:spPr>
+          <a:xfrm>
+            <a:off x="110062" y="1367130"/>
+            <a:ext cx="5149628" cy="4959851"/>
           </a:xfrm>
           <a:prstGeom prst="rect">
             <a:avLst/>
           </a:prstGeom>
-          <a:noFill/>
-        </p:spPr>
-        <p:txBody>
-          <a:bodyPr wrap="square" rtlCol="0">
-            <a:spAutoFit/>
-          </a:bodyPr>
-          <a:lstStyle/>
-          <a:p>
-            <a:r>
-              <a:rPr lang="en-US" dirty="0"/>
-              <a:t>Uncertain of the applicability of these relationships.  A new dataset was drafted grouping by zip code to see what relationships withheld a significant increase to the number of observations.</a:t>
-            </a:r>
-          </a:p>
-        </p:txBody>
-      </p:sp>
-      <p:sp>
-        <p:nvSpPr>
-          <p:cNvPr id="11" name="Rectangle 10">
+        </p:spPr>
+      </p:pic>
+      <p:sp>
+        <p:nvSpPr>
+          <p:cNvPr id="6" name="Rectangle 5">
             <a:extLst>
               <a:ext uri="{FF2B5EF4-FFF2-40B4-BE49-F238E27FC236}">
-                <a16:creationId xmlns:a16="http://schemas.microsoft.com/office/drawing/2014/main" id="{31354A5A-6438-4D86-905A-5247FAD19DF9}"/>
+                <a16:creationId xmlns:a16="http://schemas.microsoft.com/office/drawing/2014/main" id="{1CB2244D-B07F-485A-9409-00A7964ABFF7}"/>
               </a:ext>
             </a:extLst>
           </p:cNvPr>
@@ -13220,8 +13228,8 @@
         </p:nvSpPr>
         <p:spPr>
           <a:xfrm>
-            <a:off x="759620" y="2586038"/>
-            <a:ext cx="3721894" cy="116681"/>
+            <a:off x="314325" y="2047875"/>
+            <a:ext cx="4318000" cy="111125"/>
           </a:xfrm>
           <a:prstGeom prst="rect">
             <a:avLst/>
@@ -13255,10 +13263,10 @@
       </p:sp>
       <p:sp>
         <p:nvSpPr>
-          <p:cNvPr id="12" name="Rectangle 11">
+          <p:cNvPr id="7" name="Rectangle 6">
             <a:extLst>
               <a:ext uri="{FF2B5EF4-FFF2-40B4-BE49-F238E27FC236}">
-                <a16:creationId xmlns:a16="http://schemas.microsoft.com/office/drawing/2014/main" id="{8729C72F-CDBD-49EE-A7E6-7D9653D2C6CA}"/>
+                <a16:creationId xmlns:a16="http://schemas.microsoft.com/office/drawing/2014/main" id="{36E0D5E2-ADC0-4196-A156-0ACBF0BEF33F}"/>
               </a:ext>
             </a:extLst>
           </p:cNvPr>
@@ -13267,8 +13275,8 @@
         </p:nvSpPr>
         <p:spPr>
           <a:xfrm>
-            <a:off x="1412081" y="2357438"/>
-            <a:ext cx="126207" cy="3740943"/>
+            <a:off x="1412080" y="1816894"/>
+            <a:ext cx="126207" cy="4302918"/>
           </a:xfrm>
           <a:prstGeom prst="rect">
             <a:avLst/>
@@ -13302,121 +13310,50 @@
       </p:sp>
       <p:sp>
         <p:nvSpPr>
-          <p:cNvPr id="13" name="TextBox 12">
+          <p:cNvPr id="15" name="Arrow: Down 14">
             <a:extLst>
               <a:ext uri="{FF2B5EF4-FFF2-40B4-BE49-F238E27FC236}">
-                <a16:creationId xmlns:a16="http://schemas.microsoft.com/office/drawing/2014/main" id="{733F826F-203D-499A-9D79-BCF605ED1FCD}"/>
+                <a16:creationId xmlns:a16="http://schemas.microsoft.com/office/drawing/2014/main" id="{AC8595CE-13A9-442D-A84E-04AFEDB04C9A}"/>
               </a:ext>
             </a:extLst>
           </p:cNvPr>
-          <p:cNvSpPr txBox="1"/>
+          <p:cNvSpPr/>
           <p:nvPr/>
         </p:nvSpPr>
         <p:spPr>
-          <a:xfrm>
-            <a:off x="1538288" y="6326981"/>
-            <a:ext cx="2761707" cy="369332"/>
-          </a:xfrm>
-          <a:prstGeom prst="rect">
+          <a:xfrm rot="10800000">
+            <a:off x="4838700" y="5092311"/>
+            <a:ext cx="205740" cy="251460"/>
+          </a:xfrm>
+          <a:prstGeom prst="downArrow">
             <a:avLst/>
           </a:prstGeom>
-          <a:noFill/>
-        </p:spPr>
-        <p:txBody>
-          <a:bodyPr wrap="square" rtlCol="0">
-            <a:spAutoFit/>
-          </a:bodyPr>
+        </p:spPr>
+        <p:style>
+          <a:lnRef idx="2">
+            <a:schemeClr val="accent1">
+              <a:shade val="50000"/>
+            </a:schemeClr>
+          </a:lnRef>
+          <a:fillRef idx="1">
+            <a:schemeClr val="accent1"/>
+          </a:fillRef>
+          <a:effectRef idx="0">
+            <a:schemeClr val="accent1"/>
+          </a:effectRef>
+          <a:fontRef idx="minor">
+            <a:schemeClr val="lt1"/>
+          </a:fontRef>
+        </p:style>
+        <p:txBody>
+          <a:bodyPr rtlCol="0" anchor="ctr"/>
           <a:lstStyle/>
           <a:p>
-            <a:r>
-              <a:rPr lang="en-US" dirty="0"/>
-              <a:t>Total Observations: 820</a:t>
-            </a:r>
-          </a:p>
-        </p:txBody>
-      </p:sp>
-      <p:sp>
-        <p:nvSpPr>
-          <p:cNvPr id="14" name="TextBox 13">
-            <a:extLst>
-              <a:ext uri="{FF2B5EF4-FFF2-40B4-BE49-F238E27FC236}">
-                <a16:creationId xmlns:a16="http://schemas.microsoft.com/office/drawing/2014/main" id="{67174E7F-1EDC-4332-B386-5B60D76A5129}"/>
-              </a:ext>
-            </a:extLst>
-          </p:cNvPr>
-          <p:cNvSpPr txBox="1"/>
-          <p:nvPr/>
-        </p:nvSpPr>
-        <p:spPr>
-          <a:xfrm>
-            <a:off x="5822593" y="1623878"/>
-            <a:ext cx="5305425" cy="1754326"/>
-          </a:xfrm>
-          <a:prstGeom prst="rect">
-            <a:avLst/>
-          </a:prstGeom>
-          <a:noFill/>
-        </p:spPr>
-        <p:txBody>
-          <a:bodyPr wrap="square" rtlCol="0">
-            <a:spAutoFit/>
-          </a:bodyPr>
-          <a:lstStyle/>
-          <a:p>
-            <a:pPr marL="285750" indent="-285750">
-              <a:buFont typeface="Arial" panose="020B0604020202020204" pitchFamily="34" charset="0"/>
-              <a:buChar char="•"/>
-            </a:pPr>
-            <a:r>
-              <a:rPr lang="en-US" dirty="0"/>
-              <a:t>Much to my surprise, the relationships seen in the data by state all but vanished. </a:t>
-            </a:r>
-          </a:p>
-          <a:p>
-            <a:endParaRPr lang="en-US" dirty="0"/>
-          </a:p>
-          <a:p>
-            <a:pPr marL="285750" indent="-285750">
-              <a:buFont typeface="Arial" panose="020B0604020202020204" pitchFamily="34" charset="0"/>
-              <a:buChar char="•"/>
-            </a:pPr>
-            <a:r>
-              <a:rPr lang="en-US" dirty="0"/>
-              <a:t>Since there is a wide range of variation in the data, could scaling the features reveal relationships currently muted out by noise?</a:t>
-            </a:r>
-          </a:p>
-        </p:txBody>
-      </p:sp>
-      <p:pic>
-        <p:nvPicPr>
-          <p:cNvPr id="16" name="Picture 15">
-            <a:extLst>
-              <a:ext uri="{FF2B5EF4-FFF2-40B4-BE49-F238E27FC236}">
-                <a16:creationId xmlns:a16="http://schemas.microsoft.com/office/drawing/2014/main" id="{802CED6E-2E40-4D0C-9922-B89C0A56BDBE}"/>
-              </a:ext>
-            </a:extLst>
-          </p:cNvPr>
-          <p:cNvPicPr>
-            <a:picLocks noChangeAspect="1"/>
-          </p:cNvPicPr>
-          <p:nvPr/>
-        </p:nvPicPr>
-        <p:blipFill>
-          <a:blip r:embed="rId3"/>
-          <a:stretch>
-            <a:fillRect/>
-          </a:stretch>
-        </p:blipFill>
-        <p:spPr>
-          <a:xfrm>
-            <a:off x="4977518" y="3378204"/>
-            <a:ext cx="6774510" cy="3198556"/>
-          </a:xfrm>
-          <a:prstGeom prst="rect">
-            <a:avLst/>
-          </a:prstGeom>
-        </p:spPr>
-      </p:pic>
+            <a:pPr algn="ctr"/>
+            <a:endParaRPr lang="en-US"/>
+          </a:p>
+        </p:txBody>
+      </p:sp>
     </p:spTree>
     <p:extLst>
       <p:ext uri="{BB962C8B-B14F-4D97-AF65-F5344CB8AC3E}">
@@ -13447,66 +13384,6 @@
           <a:chExt cx="0" cy="0"/>
         </a:xfrm>
       </p:grpSpPr>
-      <p:pic>
-        <p:nvPicPr>
-          <p:cNvPr id="9" name="Picture 8">
-            <a:extLst>
-              <a:ext uri="{FF2B5EF4-FFF2-40B4-BE49-F238E27FC236}">
-                <a16:creationId xmlns:a16="http://schemas.microsoft.com/office/drawing/2014/main" id="{CBA4A228-531A-4334-B08C-B93895627D58}"/>
-              </a:ext>
-            </a:extLst>
-          </p:cNvPr>
-          <p:cNvPicPr>
-            <a:picLocks noChangeAspect="1"/>
-          </p:cNvPicPr>
-          <p:nvPr/>
-        </p:nvPicPr>
-        <p:blipFill>
-          <a:blip r:embed="rId2"/>
-          <a:stretch>
-            <a:fillRect/>
-          </a:stretch>
-        </p:blipFill>
-        <p:spPr>
-          <a:xfrm>
-            <a:off x="8080513" y="1090131"/>
-            <a:ext cx="4111487" cy="4111487"/>
-          </a:xfrm>
-          <a:prstGeom prst="rect">
-            <a:avLst/>
-          </a:prstGeom>
-        </p:spPr>
-      </p:pic>
-      <p:pic>
-        <p:nvPicPr>
-          <p:cNvPr id="4" name="Picture 3">
-            <a:extLst>
-              <a:ext uri="{FF2B5EF4-FFF2-40B4-BE49-F238E27FC236}">
-                <a16:creationId xmlns:a16="http://schemas.microsoft.com/office/drawing/2014/main" id="{2CEE428C-AE3D-459E-89AD-8274BFD2A63D}"/>
-              </a:ext>
-            </a:extLst>
-          </p:cNvPr>
-          <p:cNvPicPr>
-            <a:picLocks noChangeAspect="1"/>
-          </p:cNvPicPr>
-          <p:nvPr/>
-        </p:nvPicPr>
-        <p:blipFill>
-          <a:blip r:embed="rId3"/>
-          <a:stretch>
-            <a:fillRect/>
-          </a:stretch>
-        </p:blipFill>
-        <p:spPr>
-          <a:xfrm>
-            <a:off x="180532" y="1090131"/>
-            <a:ext cx="4028876" cy="4028876"/>
-          </a:xfrm>
-          <a:prstGeom prst="rect">
-            <a:avLst/>
-          </a:prstGeom>
-        </p:spPr>
-      </p:pic>
       <p:sp>
         <p:nvSpPr>
           <p:cNvPr id="2" name="Title 1">
@@ -13590,7 +13467,7 @@
           <p:nvPr/>
         </p:nvPicPr>
         <p:blipFill>
-          <a:blip r:embed="rId4"/>
+          <a:blip r:embed="rId2"/>
           <a:stretch>
             <a:fillRect/>
           </a:stretch>
@@ -13598,7 +13475,7 @@
         <p:spPr>
           <a:xfrm>
             <a:off x="3768709" y="1626152"/>
-            <a:ext cx="4311361" cy="2956834"/>
+            <a:ext cx="4311361" cy="2991568"/>
           </a:xfrm>
           <a:prstGeom prst="rect">
             <a:avLst/>
@@ -13620,7 +13497,7 @@
           <p:nvPr/>
         </p:nvPicPr>
         <p:blipFill>
-          <a:blip r:embed="rId5"/>
+          <a:blip r:embed="rId3"/>
           <a:stretch>
             <a:fillRect/>
           </a:stretch>
@@ -13756,194 +13633,6 @@
       </p:sp>
       <p:sp>
         <p:nvSpPr>
-          <p:cNvPr id="21" name="Rectangle 20">
-            <a:extLst>
-              <a:ext uri="{FF2B5EF4-FFF2-40B4-BE49-F238E27FC236}">
-                <a16:creationId xmlns:a16="http://schemas.microsoft.com/office/drawing/2014/main" id="{4C0892E9-7F53-43E5-9A14-960B458CDDB4}"/>
-              </a:ext>
-            </a:extLst>
-          </p:cNvPr>
-          <p:cNvSpPr/>
-          <p:nvPr/>
-        </p:nvSpPr>
-        <p:spPr>
-          <a:xfrm>
-            <a:off x="340519" y="1928813"/>
-            <a:ext cx="2847974" cy="97631"/>
-          </a:xfrm>
-          <a:prstGeom prst="rect">
-            <a:avLst/>
-          </a:prstGeom>
-          <a:noFill/>
-        </p:spPr>
-        <p:style>
-          <a:lnRef idx="2">
-            <a:schemeClr val="accent1">
-              <a:shade val="50000"/>
-            </a:schemeClr>
-          </a:lnRef>
-          <a:fillRef idx="1">
-            <a:schemeClr val="accent1"/>
-          </a:fillRef>
-          <a:effectRef idx="0">
-            <a:schemeClr val="accent1"/>
-          </a:effectRef>
-          <a:fontRef idx="minor">
-            <a:schemeClr val="lt1"/>
-          </a:fontRef>
-        </p:style>
-        <p:txBody>
-          <a:bodyPr rtlCol="0" anchor="ctr"/>
-          <a:lstStyle/>
-          <a:p>
-            <a:pPr algn="ctr"/>
-            <a:endParaRPr lang="en-US"/>
-          </a:p>
-        </p:txBody>
-      </p:sp>
-      <p:sp>
-        <p:nvSpPr>
-          <p:cNvPr id="22" name="Rectangle 21">
-            <a:extLst>
-              <a:ext uri="{FF2B5EF4-FFF2-40B4-BE49-F238E27FC236}">
-                <a16:creationId xmlns:a16="http://schemas.microsoft.com/office/drawing/2014/main" id="{73CB9DFA-1BF0-4793-A813-BFEC2E97587D}"/>
-              </a:ext>
-            </a:extLst>
-          </p:cNvPr>
-          <p:cNvSpPr/>
-          <p:nvPr/>
-        </p:nvSpPr>
-        <p:spPr>
-          <a:xfrm>
-            <a:off x="764381" y="1838325"/>
-            <a:ext cx="100013" cy="2847975"/>
-          </a:xfrm>
-          <a:prstGeom prst="rect">
-            <a:avLst/>
-          </a:prstGeom>
-          <a:noFill/>
-        </p:spPr>
-        <p:style>
-          <a:lnRef idx="2">
-            <a:schemeClr val="accent1">
-              <a:shade val="50000"/>
-            </a:schemeClr>
-          </a:lnRef>
-          <a:fillRef idx="1">
-            <a:schemeClr val="accent1"/>
-          </a:fillRef>
-          <a:effectRef idx="0">
-            <a:schemeClr val="accent1"/>
-          </a:effectRef>
-          <a:fontRef idx="minor">
-            <a:schemeClr val="lt1"/>
-          </a:fontRef>
-        </p:style>
-        <p:txBody>
-          <a:bodyPr rtlCol="0" anchor="ctr"/>
-          <a:lstStyle/>
-          <a:p>
-            <a:pPr algn="ctr"/>
-            <a:endParaRPr lang="en-US"/>
-          </a:p>
-        </p:txBody>
-      </p:sp>
-      <p:sp>
-        <p:nvSpPr>
-          <p:cNvPr id="23" name="Rectangle 22">
-            <a:extLst>
-              <a:ext uri="{FF2B5EF4-FFF2-40B4-BE49-F238E27FC236}">
-                <a16:creationId xmlns:a16="http://schemas.microsoft.com/office/drawing/2014/main" id="{2973E9F7-5C0A-4004-ADC7-47AA94B15FB5}"/>
-              </a:ext>
-            </a:extLst>
-          </p:cNvPr>
-          <p:cNvSpPr/>
-          <p:nvPr/>
-        </p:nvSpPr>
-        <p:spPr>
-          <a:xfrm>
-            <a:off x="8246269" y="1950243"/>
-            <a:ext cx="2907506" cy="97631"/>
-          </a:xfrm>
-          <a:prstGeom prst="rect">
-            <a:avLst/>
-          </a:prstGeom>
-          <a:noFill/>
-        </p:spPr>
-        <p:style>
-          <a:lnRef idx="2">
-            <a:schemeClr val="accent1">
-              <a:shade val="50000"/>
-            </a:schemeClr>
-          </a:lnRef>
-          <a:fillRef idx="1">
-            <a:schemeClr val="accent1"/>
-          </a:fillRef>
-          <a:effectRef idx="0">
-            <a:schemeClr val="accent1"/>
-          </a:effectRef>
-          <a:fontRef idx="minor">
-            <a:schemeClr val="lt1"/>
-          </a:fontRef>
-        </p:style>
-        <p:txBody>
-          <a:bodyPr rtlCol="0" anchor="ctr"/>
-          <a:lstStyle/>
-          <a:p>
-            <a:pPr algn="ctr"/>
-            <a:endParaRPr lang="en-US"/>
-          </a:p>
-        </p:txBody>
-      </p:sp>
-      <p:sp>
-        <p:nvSpPr>
-          <p:cNvPr id="24" name="Rectangle 23">
-            <a:extLst>
-              <a:ext uri="{FF2B5EF4-FFF2-40B4-BE49-F238E27FC236}">
-                <a16:creationId xmlns:a16="http://schemas.microsoft.com/office/drawing/2014/main" id="{EFE8E89F-22D9-43A1-A5A0-E8865E72AFCC}"/>
-              </a:ext>
-            </a:extLst>
-          </p:cNvPr>
-          <p:cNvSpPr/>
-          <p:nvPr/>
-        </p:nvSpPr>
-        <p:spPr>
-          <a:xfrm>
-            <a:off x="8677276" y="1854994"/>
-            <a:ext cx="102393" cy="2905125"/>
-          </a:xfrm>
-          <a:prstGeom prst="rect">
-            <a:avLst/>
-          </a:prstGeom>
-          <a:noFill/>
-        </p:spPr>
-        <p:style>
-          <a:lnRef idx="2">
-            <a:schemeClr val="accent1">
-              <a:shade val="50000"/>
-            </a:schemeClr>
-          </a:lnRef>
-          <a:fillRef idx="1">
-            <a:schemeClr val="accent1"/>
-          </a:fillRef>
-          <a:effectRef idx="0">
-            <a:schemeClr val="accent1"/>
-          </a:effectRef>
-          <a:fontRef idx="minor">
-            <a:schemeClr val="lt1"/>
-          </a:fontRef>
-        </p:style>
-        <p:txBody>
-          <a:bodyPr rtlCol="0" anchor="ctr"/>
-          <a:lstStyle/>
-          <a:p>
-            <a:pPr algn="ctr"/>
-            <a:endParaRPr lang="en-US"/>
-          </a:p>
-        </p:txBody>
-      </p:sp>
-      <p:sp>
-        <p:nvSpPr>
           <p:cNvPr id="25" name="TextBox 24">
             <a:extLst>
               <a:ext uri="{FF2B5EF4-FFF2-40B4-BE49-F238E27FC236}">
@@ -14007,6 +13696,66 @@
           </a:p>
         </p:txBody>
       </p:sp>
+      <p:pic>
+        <p:nvPicPr>
+          <p:cNvPr id="5" name="Picture 4">
+            <a:extLst>
+              <a:ext uri="{FF2B5EF4-FFF2-40B4-BE49-F238E27FC236}">
+                <a16:creationId xmlns:a16="http://schemas.microsoft.com/office/drawing/2014/main" id="{39433A98-6469-4CB6-B77D-03CCCC99DB96}"/>
+              </a:ext>
+            </a:extLst>
+          </p:cNvPr>
+          <p:cNvPicPr>
+            <a:picLocks noChangeAspect="1"/>
+          </p:cNvPicPr>
+          <p:nvPr/>
+        </p:nvPicPr>
+        <p:blipFill>
+          <a:blip r:embed="rId4"/>
+          <a:stretch>
+            <a:fillRect/>
+          </a:stretch>
+        </p:blipFill>
+        <p:spPr>
+          <a:xfrm>
+            <a:off x="8199614" y="1619258"/>
+            <a:ext cx="3372514" cy="3108503"/>
+          </a:xfrm>
+          <a:prstGeom prst="rect">
+            <a:avLst/>
+          </a:prstGeom>
+        </p:spPr>
+      </p:pic>
+      <p:pic>
+        <p:nvPicPr>
+          <p:cNvPr id="10" name="Picture 9">
+            <a:extLst>
+              <a:ext uri="{FF2B5EF4-FFF2-40B4-BE49-F238E27FC236}">
+                <a16:creationId xmlns:a16="http://schemas.microsoft.com/office/drawing/2014/main" id="{49B4173F-A230-4495-BF2B-F6F265D3A31E}"/>
+              </a:ext>
+            </a:extLst>
+          </p:cNvPr>
+          <p:cNvPicPr>
+            <a:picLocks noChangeAspect="1"/>
+          </p:cNvPicPr>
+          <p:nvPr/>
+        </p:nvPicPr>
+        <p:blipFill>
+          <a:blip r:embed="rId5"/>
+          <a:stretch>
+            <a:fillRect/>
+          </a:stretch>
+        </p:blipFill>
+        <p:spPr>
+          <a:xfrm>
+            <a:off x="275766" y="1626151"/>
+            <a:ext cx="3492499" cy="3101611"/>
+          </a:xfrm>
+          <a:prstGeom prst="rect">
+            <a:avLst/>
+          </a:prstGeom>
+        </p:spPr>
+      </p:pic>
     </p:spTree>
     <p:extLst>
       <p:ext uri="{BB962C8B-B14F-4D97-AF65-F5344CB8AC3E}">
@@ -14039,10 +13788,10 @@
       </p:grpSpPr>
       <p:pic>
         <p:nvPicPr>
-          <p:cNvPr id="4" name="Picture 3">
+          <p:cNvPr id="9" name="Picture 8">
             <a:extLst>
               <a:ext uri="{FF2B5EF4-FFF2-40B4-BE49-F238E27FC236}">
-                <a16:creationId xmlns:a16="http://schemas.microsoft.com/office/drawing/2014/main" id="{0BF29A86-C709-4E5B-91E2-4527ED93C0E6}"/>
+                <a16:creationId xmlns:a16="http://schemas.microsoft.com/office/drawing/2014/main" id="{D517A59C-A4B3-41EF-BD00-042773B3B3CA}"/>
               </a:ext>
             </a:extLst>
           </p:cNvPr>
@@ -14059,8 +13808,8 @@
         </p:blipFill>
         <p:spPr>
           <a:xfrm>
-            <a:off x="288812" y="1017083"/>
-            <a:ext cx="5494564" cy="5494564"/>
+            <a:off x="521095" y="1644129"/>
+            <a:ext cx="4922162" cy="4634596"/>
           </a:xfrm>
           <a:prstGeom prst="rect">
             <a:avLst/>
@@ -14172,10 +13921,103 @@
       </p:sp>
       <p:sp>
         <p:nvSpPr>
-          <p:cNvPr id="5" name="Rectangle 4">
+          <p:cNvPr id="7" name="TextBox 6">
             <a:extLst>
               <a:ext uri="{FF2B5EF4-FFF2-40B4-BE49-F238E27FC236}">
-                <a16:creationId xmlns:a16="http://schemas.microsoft.com/office/drawing/2014/main" id="{48C721EE-226A-4CC2-9D1C-73ED83AD4DFD}"/>
+                <a16:creationId xmlns:a16="http://schemas.microsoft.com/office/drawing/2014/main" id="{DC472901-29D9-4C84-AD4B-15D5C174A71A}"/>
+              </a:ext>
+            </a:extLst>
+          </p:cNvPr>
+          <p:cNvSpPr txBox="1"/>
+          <p:nvPr/>
+        </p:nvSpPr>
+        <p:spPr>
+          <a:xfrm>
+            <a:off x="5783375" y="1644129"/>
+            <a:ext cx="5539281" cy="4801314"/>
+          </a:xfrm>
+          <a:prstGeom prst="rect">
+            <a:avLst/>
+          </a:prstGeom>
+          <a:noFill/>
+        </p:spPr>
+        <p:txBody>
+          <a:bodyPr wrap="square" rtlCol="0">
+            <a:spAutoFit/>
+          </a:bodyPr>
+          <a:lstStyle/>
+          <a:p>
+            <a:pPr marL="285750" indent="-285750">
+              <a:buFont typeface="Arial" panose="020B0604020202020204" pitchFamily="34" charset="0"/>
+              <a:buChar char="•"/>
+            </a:pPr>
+            <a:r>
+              <a:rPr lang="en-US" dirty="0"/>
+              <a:t>The relationships with readmission ratio remained weak at best.</a:t>
+            </a:r>
+          </a:p>
+          <a:p>
+            <a:endParaRPr lang="en-US" dirty="0"/>
+          </a:p>
+          <a:p>
+            <a:pPr marL="285750" indent="-285750">
+              <a:buFont typeface="Arial" panose="020B0604020202020204" pitchFamily="34" charset="0"/>
+              <a:buChar char="•"/>
+            </a:pPr>
+            <a:r>
+              <a:rPr lang="en-US" dirty="0"/>
+              <a:t>Interestingly, flu shot, pneumonia shot, and decreased movement pain ratings display weaker correlations in the same direction as they did in the grouped by state dataset.</a:t>
+            </a:r>
+          </a:p>
+          <a:p>
+            <a:pPr marL="285750" indent="-285750">
+              <a:buFont typeface="Arial" panose="020B0604020202020204" pitchFamily="34" charset="0"/>
+              <a:buChar char="•"/>
+            </a:pPr>
+            <a:endParaRPr lang="en-US" dirty="0"/>
+          </a:p>
+          <a:p>
+            <a:pPr marL="285750" indent="-285750">
+              <a:buFont typeface="Arial" panose="020B0604020202020204" pitchFamily="34" charset="0"/>
+              <a:buChar char="•"/>
+            </a:pPr>
+            <a:r>
+              <a:rPr lang="en-US" dirty="0"/>
+              <a:t>After multiple models of reviewing the available data, it does not appear that there are any significant relationships between HHC quality and readmission ratios.</a:t>
+            </a:r>
+          </a:p>
+          <a:p>
+            <a:pPr marL="285750" indent="-285750">
+              <a:buFont typeface="Arial" panose="020B0604020202020204" pitchFamily="34" charset="0"/>
+              <a:buChar char="•"/>
+            </a:pPr>
+            <a:endParaRPr lang="en-US" dirty="0"/>
+          </a:p>
+          <a:p>
+            <a:pPr marL="285750" indent="-285750">
+              <a:buFont typeface="Arial" panose="020B0604020202020204" pitchFamily="34" charset="0"/>
+              <a:buChar char="•"/>
+            </a:pPr>
+            <a:r>
+              <a:rPr lang="en-US" dirty="0"/>
+              <a:t>However, there is information in this analysis that an HHC client would find both actionable and useful.</a:t>
+            </a:r>
+          </a:p>
+          <a:p>
+            <a:pPr marL="285750" indent="-285750">
+              <a:buFont typeface="Arial" panose="020B0604020202020204" pitchFamily="34" charset="0"/>
+              <a:buChar char="•"/>
+            </a:pPr>
+            <a:endParaRPr lang="en-US" dirty="0"/>
+          </a:p>
+        </p:txBody>
+      </p:sp>
+      <p:sp>
+        <p:nvSpPr>
+          <p:cNvPr id="10" name="Rectangle 9">
+            <a:extLst>
+              <a:ext uri="{FF2B5EF4-FFF2-40B4-BE49-F238E27FC236}">
+                <a16:creationId xmlns:a16="http://schemas.microsoft.com/office/drawing/2014/main" id="{9D6425F0-ADBE-4AA4-AD77-EE8E3950D870}"/>
               </a:ext>
             </a:extLst>
           </p:cNvPr>
@@ -14184,8 +14026,8 @@
         </p:nvSpPr>
         <p:spPr>
           <a:xfrm>
-            <a:off x="520700" y="2044701"/>
-            <a:ext cx="3870325" cy="114300"/>
+            <a:off x="1528763" y="2059781"/>
+            <a:ext cx="116682" cy="4036220"/>
           </a:xfrm>
           <a:prstGeom prst="rect">
             <a:avLst/>
@@ -14219,10 +14061,10 @@
       </p:sp>
       <p:sp>
         <p:nvSpPr>
-          <p:cNvPr id="6" name="Rectangle 5">
+          <p:cNvPr id="11" name="Rectangle 10">
             <a:extLst>
               <a:ext uri="{FF2B5EF4-FFF2-40B4-BE49-F238E27FC236}">
-                <a16:creationId xmlns:a16="http://schemas.microsoft.com/office/drawing/2014/main" id="{536F6B20-CF22-423A-B0EF-10534F6636F4}"/>
+                <a16:creationId xmlns:a16="http://schemas.microsoft.com/office/drawing/2014/main" id="{92EFCC74-8E05-4B25-81B2-83B6EEDAFB38}"/>
               </a:ext>
             </a:extLst>
           </p:cNvPr>
@@ -14231,8 +14073,8 @@
         </p:nvSpPr>
         <p:spPr>
           <a:xfrm>
-            <a:off x="968375" y="2044701"/>
-            <a:ext cx="130175" cy="3883024"/>
+            <a:off x="721519" y="2059781"/>
+            <a:ext cx="4017962" cy="109538"/>
           </a:xfrm>
           <a:prstGeom prst="rect">
             <a:avLst/>
@@ -14266,94 +14108,47 @@
       </p:sp>
       <p:sp>
         <p:nvSpPr>
-          <p:cNvPr id="7" name="TextBox 6">
+          <p:cNvPr id="12" name="Arrow: Right 11">
             <a:extLst>
               <a:ext uri="{FF2B5EF4-FFF2-40B4-BE49-F238E27FC236}">
-                <a16:creationId xmlns:a16="http://schemas.microsoft.com/office/drawing/2014/main" id="{DC472901-29D9-4C84-AD4B-15D5C174A71A}"/>
+                <a16:creationId xmlns:a16="http://schemas.microsoft.com/office/drawing/2014/main" id="{C75DBAFF-5EFC-4F65-B542-93476DB4723E}"/>
               </a:ext>
             </a:extLst>
           </p:cNvPr>
-          <p:cNvSpPr txBox="1"/>
+          <p:cNvSpPr/>
           <p:nvPr/>
         </p:nvSpPr>
         <p:spPr>
-          <a:xfrm>
-            <a:off x="5783375" y="1644129"/>
-            <a:ext cx="5539281" cy="4801314"/>
-          </a:xfrm>
-          <a:prstGeom prst="rect">
+          <a:xfrm rot="10800000">
+            <a:off x="5389385" y="4745684"/>
+            <a:ext cx="312332" cy="183981"/>
+          </a:xfrm>
+          <a:prstGeom prst="rightArrow">
             <a:avLst/>
           </a:prstGeom>
-          <a:noFill/>
-        </p:spPr>
-        <p:txBody>
-          <a:bodyPr wrap="square" rtlCol="0">
-            <a:spAutoFit/>
-          </a:bodyPr>
+        </p:spPr>
+        <p:style>
+          <a:lnRef idx="2">
+            <a:schemeClr val="accent1">
+              <a:shade val="50000"/>
+            </a:schemeClr>
+          </a:lnRef>
+          <a:fillRef idx="1">
+            <a:schemeClr val="accent1"/>
+          </a:fillRef>
+          <a:effectRef idx="0">
+            <a:schemeClr val="accent1"/>
+          </a:effectRef>
+          <a:fontRef idx="minor">
+            <a:schemeClr val="lt1"/>
+          </a:fontRef>
+        </p:style>
+        <p:txBody>
+          <a:bodyPr rtlCol="0" anchor="ctr"/>
           <a:lstStyle/>
           <a:p>
-            <a:pPr marL="285750" indent="-285750">
-              <a:buFont typeface="Arial" panose="020B0604020202020204" pitchFamily="34" charset="0"/>
-              <a:buChar char="•"/>
-            </a:pPr>
-            <a:r>
-              <a:rPr lang="en-US" dirty="0"/>
-              <a:t>The relationships with readmission ratio remained weak at best.</a:t>
-            </a:r>
-          </a:p>
-          <a:p>
-            <a:endParaRPr lang="en-US" dirty="0"/>
-          </a:p>
-          <a:p>
-            <a:pPr marL="285750" indent="-285750">
-              <a:buFont typeface="Arial" panose="020B0604020202020204" pitchFamily="34" charset="0"/>
-              <a:buChar char="•"/>
-            </a:pPr>
-            <a:r>
-              <a:rPr lang="en-US" dirty="0"/>
-              <a:t>Interestingly, flu shot, pneumonia shot, and decreased movement pain ratings display weaker correlations in the same direction as they did in the grouped by state dataset.</a:t>
-            </a:r>
-          </a:p>
-          <a:p>
-            <a:pPr marL="285750" indent="-285750">
-              <a:buFont typeface="Arial" panose="020B0604020202020204" pitchFamily="34" charset="0"/>
-              <a:buChar char="•"/>
-            </a:pPr>
-            <a:endParaRPr lang="en-US" dirty="0"/>
-          </a:p>
-          <a:p>
-            <a:pPr marL="285750" indent="-285750">
-              <a:buFont typeface="Arial" panose="020B0604020202020204" pitchFamily="34" charset="0"/>
-              <a:buChar char="•"/>
-            </a:pPr>
-            <a:r>
-              <a:rPr lang="en-US" dirty="0"/>
-              <a:t>After multiple models of reviewing the available data, it does not appear that there are any significant relationships between HHC quality and readmission ratios.</a:t>
-            </a:r>
-          </a:p>
-          <a:p>
-            <a:pPr marL="285750" indent="-285750">
-              <a:buFont typeface="Arial" panose="020B0604020202020204" pitchFamily="34" charset="0"/>
-              <a:buChar char="•"/>
-            </a:pPr>
-            <a:endParaRPr lang="en-US" dirty="0"/>
-          </a:p>
-          <a:p>
-            <a:pPr marL="285750" indent="-285750">
-              <a:buFont typeface="Arial" panose="020B0604020202020204" pitchFamily="34" charset="0"/>
-              <a:buChar char="•"/>
-            </a:pPr>
-            <a:r>
-              <a:rPr lang="en-US" dirty="0"/>
-              <a:t>However, there is information in this analysis that an HHC client would find both actionable and useful.</a:t>
-            </a:r>
-          </a:p>
-          <a:p>
-            <a:pPr marL="285750" indent="-285750">
-              <a:buFont typeface="Arial" panose="020B0604020202020204" pitchFamily="34" charset="0"/>
-              <a:buChar char="•"/>
-            </a:pPr>
-            <a:endParaRPr lang="en-US" dirty="0"/>
+            <a:pPr algn="ctr"/>
+            <a:endParaRPr lang="en-US"/>
           </a:p>
         </p:txBody>
       </p:sp>

</xml_diff>